<commit_message>
Finishing all exercices, small part
</commit_message>
<xml_diff>
--- a/Les11/H10_C__11_notas.pptx
+++ b/Les11/H10_C__11_notas.pptx
@@ -1775,10 +1775,10 @@
               <a:t>verplicht</a:t>
             </a:r>
             <a:r>
-              <a:rPr lang="en-US" baseline="0" smtClean="0"/>
+              <a:rPr lang="en-US" baseline="0" dirty="0" smtClean="0"/>
               <a:t>!!</a:t>
             </a:r>
-            <a:endParaRPr lang="en-US"/>
+            <a:endParaRPr lang="en-US" dirty="0"/>
           </a:p>
         </p:txBody>
       </p:sp>

</xml_diff>